<commit_message>
Update Python Projects & Dataset on Applied Statistics/Presentation on Python projects in Applied Statistics.pptx
</commit_message>
<xml_diff>
--- a/Python Projects & Dataset on Applied Statistics/Presentation on Python projects in Applied Statistics.pptx
+++ b/Python Projects & Dataset on Applied Statistics/Presentation on Python projects in Applied Statistics.pptx
@@ -10894,13 +10894,9 @@
           <a:p>
             <a:r>
               <a:rPr lang="en-US" dirty="0" smtClean="0"/>
-              <a:t>Find the properties of </a:t>
-            </a:r>
-            <a:r>
-              <a:rPr lang="en-US" smtClean="0"/>
-              <a:t>certain variable</a:t>
-            </a:r>
-            <a:endParaRPr lang="en-US"/>
+              <a:t>Find the properties of certain variable</a:t>
+            </a:r>
+            <a:endParaRPr lang="en-US" dirty="0"/>
           </a:p>
         </p:txBody>
       </p:sp>

</xml_diff>